<commit_message>
Updated the main page
</commit_message>
<xml_diff>
--- a/slides/intro-deck.pptx
+++ b/slides/intro-deck.pptx
@@ -9,7 +9,8 @@
     <p:sldId id="260" r:id="rId3"/>
     <p:sldId id="257" r:id="rId4"/>
     <p:sldId id="258" r:id="rId5"/>
-    <p:sldId id="259" r:id="rId6"/>
+    <p:sldId id="261" r:id="rId6"/>
+    <p:sldId id="259" r:id="rId7"/>
   </p:sldIdLst>
   <p:sldSz cx="12192000" cy="6858000"/>
   <p:notesSz cx="6858000" cy="9144000"/>
@@ -17814,6 +17815,95 @@
           <p:cNvPr id="2" name="Title 1">
             <a:extLst>
               <a:ext uri="{FF2B5EF4-FFF2-40B4-BE49-F238E27FC236}">
+                <a16:creationId xmlns:a16="http://schemas.microsoft.com/office/drawing/2014/main" id="{A46A3085-13C0-B146-9ADF-B53B74B2BA18}"/>
+              </a:ext>
+            </a:extLst>
+          </p:cNvPr>
+          <p:cNvSpPr>
+            <a:spLocks noGrp="1"/>
+          </p:cNvSpPr>
+          <p:nvPr>
+            <p:ph type="title"/>
+          </p:nvPr>
+        </p:nvSpPr>
+        <p:spPr/>
+        <p:txBody>
+          <a:bodyPr/>
+          <a:lstStyle/>
+          <a:p>
+            <a:r>
+              <a:rPr lang="en-US" dirty="0"/>
+              <a:t>REPO</a:t>
+            </a:r>
+          </a:p>
+        </p:txBody>
+      </p:sp>
+      <p:sp>
+        <p:nvSpPr>
+          <p:cNvPr id="3" name="Content Placeholder 2">
+            <a:extLst>
+              <a:ext uri="{FF2B5EF4-FFF2-40B4-BE49-F238E27FC236}">
+                <a16:creationId xmlns:a16="http://schemas.microsoft.com/office/drawing/2014/main" id="{2291A3B4-FA4E-6B47-8085-D606EC109256}"/>
+              </a:ext>
+            </a:extLst>
+          </p:cNvPr>
+          <p:cNvSpPr>
+            <a:spLocks noGrp="1"/>
+          </p:cNvSpPr>
+          <p:nvPr>
+            <p:ph idx="1"/>
+          </p:nvPr>
+        </p:nvSpPr>
+        <p:spPr/>
+        <p:txBody>
+          <a:bodyPr/>
+          <a:lstStyle/>
+          <a:p>
+            <a:r>
+              <a:rPr lang="en-GB" dirty="0">
+                <a:hlinkClick r:id="rId2"/>
+              </a:rPr>
+              <a:t>https://github.com/mufajjul/aml-govsec2020-workshop</a:t>
+            </a:r>
+            <a:endParaRPr lang="en-US" dirty="0"/>
+          </a:p>
+        </p:txBody>
+      </p:sp>
+    </p:spTree>
+    <p:extLst>
+      <p:ext uri="{BB962C8B-B14F-4D97-AF65-F5344CB8AC3E}">
+        <p14:creationId xmlns:p14="http://schemas.microsoft.com/office/powerpoint/2010/main" val="2309845184"/>
+      </p:ext>
+    </p:extLst>
+  </p:cSld>
+  <p:clrMapOvr>
+    <a:masterClrMapping/>
+  </p:clrMapOvr>
+</p:sld>
+</file>
+
+<file path=ppt/slides/slide6.xml><?xml version="1.0" encoding="utf-8"?>
+<p:sld xmlns:a="http://schemas.openxmlformats.org/drawingml/2006/main" xmlns:r="http://schemas.openxmlformats.org/officeDocument/2006/relationships" xmlns:p="http://schemas.openxmlformats.org/presentationml/2006/main">
+  <p:cSld>
+    <p:spTree>
+      <p:nvGrpSpPr>
+        <p:cNvPr id="1" name=""/>
+        <p:cNvGrpSpPr/>
+        <p:nvPr/>
+      </p:nvGrpSpPr>
+      <p:grpSpPr>
+        <a:xfrm>
+          <a:off x="0" y="0"/>
+          <a:ext cx="0" cy="0"/>
+          <a:chOff x="0" y="0"/>
+          <a:chExt cx="0" cy="0"/>
+        </a:xfrm>
+      </p:grpSpPr>
+      <p:sp>
+        <p:nvSpPr>
+          <p:cNvPr id="2" name="Title 1">
+            <a:extLst>
+              <a:ext uri="{FF2B5EF4-FFF2-40B4-BE49-F238E27FC236}">
                 <a16:creationId xmlns:a16="http://schemas.microsoft.com/office/drawing/2014/main" id="{26C9C670-0D83-8549-A4D2-4B6E62E77FA6}"/>
               </a:ext>
             </a:extLst>

</xml_diff>

<commit_message>
Changed session 5 PDF location
</commit_message>
<xml_diff>
--- a/slides/intro-deck.pptx
+++ b/slides/intro-deck.pptx
@@ -3317,7 +3317,7 @@
           </a:pPr>
           <a:r>
             <a:rPr lang="en-US" dirty="0"/>
-            <a:t>14:30 – 16:00</a:t>
+            <a:t>14:50 – 16:00</a:t>
           </a:r>
         </a:p>
       </dgm:t>
@@ -7780,7 +7780,7 @@
           </a:pPr>
           <a:r>
             <a:rPr lang="en-US" sz="1600" kern="1200" dirty="0"/>
-            <a:t>14:30 – 16:00</a:t>
+            <a:t>14:50 – 16:00</a:t>
           </a:r>
         </a:p>
       </dsp:txBody>
@@ -12398,7 +12398,7 @@
           <a:p>
             <a:fld id="{D4A213A3-10E9-421F-81BE-56E0786AB515}" type="datetime2">
               <a:rPr lang="en-US" smtClean="0"/>
-              <a:t>Monday, June 29, 2020</a:t>
+              <a:t>Wednesday, July 1, 2020</a:t>
             </a:fld>
             <a:endParaRPr lang="en-US"/>
           </a:p>
@@ -12596,7 +12596,7 @@
           <a:p>
             <a:fld id="{3D5DABC0-2199-478F-BA77-33A651B6CB89}" type="datetime2">
               <a:rPr lang="en-US" smtClean="0"/>
-              <a:t>Monday, June 29, 2020</a:t>
+              <a:t>Wednesday, July 1, 2020</a:t>
             </a:fld>
             <a:endParaRPr lang="en-US"/>
           </a:p>
@@ -12805,7 +12805,7 @@
           <a:p>
             <a:fld id="{D72230C6-DF61-47F4-B8C5-1B70E884BF06}" type="datetime2">
               <a:rPr lang="en-US" smtClean="0"/>
-              <a:t>Monday, June 29, 2020</a:t>
+              <a:t>Wednesday, July 1, 2020</a:t>
             </a:fld>
             <a:endParaRPr lang="en-US"/>
           </a:p>
@@ -13015,7 +13015,7 @@
           <a:p>
             <a:fld id="{6B12B50C-7EEE-46CD-BAF7-BBC4026D959A}" type="datetime2">
               <a:rPr lang="en-US" smtClean="0"/>
-              <a:t>Monday, June 29, 2020</a:t>
+              <a:t>Wednesday, July 1, 2020</a:t>
             </a:fld>
             <a:endParaRPr lang="en-US"/>
           </a:p>
@@ -13295,7 +13295,7 @@
           <a:p>
             <a:fld id="{8D4211C4-AE09-4254-A5E3-6DA9B099C971}" type="datetime2">
               <a:rPr lang="en-US" smtClean="0"/>
-              <a:t>Monday, June 29, 2020</a:t>
+              <a:t>Wednesday, July 1, 2020</a:t>
             </a:fld>
             <a:endParaRPr lang="en-US"/>
           </a:p>
@@ -13574,7 +13574,7 @@
           <a:p>
             <a:fld id="{681742C3-E082-4760-93B2-E209268DD00C}" type="datetime2">
               <a:rPr lang="en-US" smtClean="0"/>
-              <a:t>Monday, June 29, 2020</a:t>
+              <a:t>Wednesday, July 1, 2020</a:t>
             </a:fld>
             <a:endParaRPr lang="en-US"/>
           </a:p>
@@ -13995,7 +13995,7 @@
           <a:p>
             <a:fld id="{3B6FC950-F824-48B9-B984-CAEE265865E5}" type="datetime2">
               <a:rPr lang="en-US" smtClean="0"/>
-              <a:t>Monday, June 29, 2020</a:t>
+              <a:t>Wednesday, July 1, 2020</a:t>
             </a:fld>
             <a:endParaRPr lang="en-US"/>
           </a:p>
@@ -14148,7 +14148,7 @@
           <a:p>
             <a:fld id="{BC8E3A0F-68E7-4D17-BB84-ED1BA4F6AC6B}" type="datetime2">
               <a:rPr lang="en-US" smtClean="0"/>
-              <a:t>Monday, June 29, 2020</a:t>
+              <a:t>Wednesday, July 1, 2020</a:t>
             </a:fld>
             <a:endParaRPr lang="en-US"/>
           </a:p>
@@ -14261,7 +14261,7 @@
           <a:p>
             <a:fld id="{EDB7BC4F-EDA1-4BA2-BFF3-FE5B31CCB58B}" type="datetime2">
               <a:rPr lang="en-US" smtClean="0"/>
-              <a:t>Monday, June 29, 2020</a:t>
+              <a:t>Wednesday, July 1, 2020</a:t>
             </a:fld>
             <a:endParaRPr lang="en-US"/>
           </a:p>
@@ -14575,7 +14575,7 @@
           <a:p>
             <a:fld id="{3AAE694C-1394-4838-A564-7380835C2E77}" type="datetime2">
               <a:rPr lang="en-US" smtClean="0"/>
-              <a:t>Monday, June 29, 2020</a:t>
+              <a:t>Wednesday, July 1, 2020</a:t>
             </a:fld>
             <a:endParaRPr lang="en-US"/>
           </a:p>
@@ -14868,7 +14868,7 @@
           <a:p>
             <a:fld id="{CAB84B19-1A00-4EDB-8425-E1827A377364}" type="datetime2">
               <a:rPr lang="en-US" smtClean="0"/>
-              <a:t>Monday, June 29, 2020</a:t>
+              <a:t>Wednesday, July 1, 2020</a:t>
             </a:fld>
             <a:endParaRPr lang="en-US"/>
           </a:p>
@@ -15237,7 +15237,7 @@
           <a:p>
             <a:fld id="{10076A27-8146-4F75-9851-A83577C6FD8A}" type="datetime2">
               <a:rPr lang="en-US" smtClean="0"/>
-              <a:t>Monday, June 29, 2020</a:t>
+              <a:t>Wednesday, July 1, 2020</a:t>
             </a:fld>
             <a:endParaRPr lang="en-US"/>
           </a:p>
@@ -17765,7 +17765,7 @@
             <p:ph idx="1"/>
             <p:extLst>
               <p:ext uri="{D42A27DB-BD31-4B8C-83A1-F6EECF244321}">
-                <p14:modId xmlns:p14="http://schemas.microsoft.com/office/powerpoint/2010/main" val="1234208825"/>
+                <p14:modId xmlns:p14="http://schemas.microsoft.com/office/powerpoint/2010/main" val="664349624"/>
               </p:ext>
             </p:extLst>
           </p:nvPr>

</xml_diff>